<commit_message>
All all simple example
</commit_message>
<xml_diff>
--- a/docs/Gravitrax/Arduino-code/cablage.pptx
+++ b/docs/Gravitrax/Arduino-code/cablage.pptx
@@ -6,6 +6,9 @@
   </p:sldMasterIdLst>
   <p:sldIdLst>
     <p:sldId id="256" r:id="rId2"/>
+    <p:sldId id="257" r:id="rId3"/>
+    <p:sldId id="258" r:id="rId4"/>
+    <p:sldId id="259" r:id="rId5"/>
   </p:sldIdLst>
   <p:sldSz cx="12192000" cy="6858000"/>
   <p:notesSz cx="6858000" cy="9144000"/>
@@ -104,6 +107,11 @@
       </a:defRPr>
     </a:lvl9pPr>
   </p:defaultTextStyle>
+  <p:extLst>
+    <p:ext uri="{EFAFB233-063F-42B5-8137-9DF3F51BA10A}">
+      <p15:sldGuideLst xmlns:p15="http://schemas.microsoft.com/office/powerpoint/2012/main"/>
+    </p:ext>
+  </p:extLst>
 </p:presentation>
 </file>
 
@@ -254,7 +262,7 @@
           <a:p>
             <a:fld id="{EAA3FA95-C771-E941-BEA2-0E3AE19BD5D0}" type="datetimeFigureOut">
               <a:rPr lang="fr-FR" smtClean="0"/>
-              <a:t>01/11/2023</a:t>
+              <a:t>04/11/2023</a:t>
             </a:fld>
             <a:endParaRPr lang="fr-FR"/>
           </a:p>
@@ -452,7 +460,7 @@
           <a:p>
             <a:fld id="{EAA3FA95-C771-E941-BEA2-0E3AE19BD5D0}" type="datetimeFigureOut">
               <a:rPr lang="fr-FR" smtClean="0"/>
-              <a:t>01/11/2023</a:t>
+              <a:t>04/11/2023</a:t>
             </a:fld>
             <a:endParaRPr lang="fr-FR"/>
           </a:p>
@@ -660,7 +668,7 @@
           <a:p>
             <a:fld id="{EAA3FA95-C771-E941-BEA2-0E3AE19BD5D0}" type="datetimeFigureOut">
               <a:rPr lang="fr-FR" smtClean="0"/>
-              <a:t>01/11/2023</a:t>
+              <a:t>04/11/2023</a:t>
             </a:fld>
             <a:endParaRPr lang="fr-FR"/>
           </a:p>
@@ -858,7 +866,7 @@
           <a:p>
             <a:fld id="{EAA3FA95-C771-E941-BEA2-0E3AE19BD5D0}" type="datetimeFigureOut">
               <a:rPr lang="fr-FR" smtClean="0"/>
-              <a:t>01/11/2023</a:t>
+              <a:t>04/11/2023</a:t>
             </a:fld>
             <a:endParaRPr lang="fr-FR"/>
           </a:p>
@@ -1133,7 +1141,7 @@
           <a:p>
             <a:fld id="{EAA3FA95-C771-E941-BEA2-0E3AE19BD5D0}" type="datetimeFigureOut">
               <a:rPr lang="fr-FR" smtClean="0"/>
-              <a:t>01/11/2023</a:t>
+              <a:t>04/11/2023</a:t>
             </a:fld>
             <a:endParaRPr lang="fr-FR"/>
           </a:p>
@@ -1398,7 +1406,7 @@
           <a:p>
             <a:fld id="{EAA3FA95-C771-E941-BEA2-0E3AE19BD5D0}" type="datetimeFigureOut">
               <a:rPr lang="fr-FR" smtClean="0"/>
-              <a:t>01/11/2023</a:t>
+              <a:t>04/11/2023</a:t>
             </a:fld>
             <a:endParaRPr lang="fr-FR"/>
           </a:p>
@@ -1810,7 +1818,7 @@
           <a:p>
             <a:fld id="{EAA3FA95-C771-E941-BEA2-0E3AE19BD5D0}" type="datetimeFigureOut">
               <a:rPr lang="fr-FR" smtClean="0"/>
-              <a:t>01/11/2023</a:t>
+              <a:t>04/11/2023</a:t>
             </a:fld>
             <a:endParaRPr lang="fr-FR"/>
           </a:p>
@@ -1951,7 +1959,7 @@
           <a:p>
             <a:fld id="{EAA3FA95-C771-E941-BEA2-0E3AE19BD5D0}" type="datetimeFigureOut">
               <a:rPr lang="fr-FR" smtClean="0"/>
-              <a:t>01/11/2023</a:t>
+              <a:t>04/11/2023</a:t>
             </a:fld>
             <a:endParaRPr lang="fr-FR"/>
           </a:p>
@@ -2064,7 +2072,7 @@
           <a:p>
             <a:fld id="{EAA3FA95-C771-E941-BEA2-0E3AE19BD5D0}" type="datetimeFigureOut">
               <a:rPr lang="fr-FR" smtClean="0"/>
-              <a:t>01/11/2023</a:t>
+              <a:t>04/11/2023</a:t>
             </a:fld>
             <a:endParaRPr lang="fr-FR"/>
           </a:p>
@@ -2375,7 +2383,7 @@
           <a:p>
             <a:fld id="{EAA3FA95-C771-E941-BEA2-0E3AE19BD5D0}" type="datetimeFigureOut">
               <a:rPr lang="fr-FR" smtClean="0"/>
-              <a:t>01/11/2023</a:t>
+              <a:t>04/11/2023</a:t>
             </a:fld>
             <a:endParaRPr lang="fr-FR"/>
           </a:p>
@@ -2663,7 +2671,7 @@
           <a:p>
             <a:fld id="{EAA3FA95-C771-E941-BEA2-0E3AE19BD5D0}" type="datetimeFigureOut">
               <a:rPr lang="fr-FR" smtClean="0"/>
-              <a:t>01/11/2023</a:t>
+              <a:t>04/11/2023</a:t>
             </a:fld>
             <a:endParaRPr lang="fr-FR"/>
           </a:p>
@@ -2904,7 +2912,7 @@
           <a:p>
             <a:fld id="{EAA3FA95-C771-E941-BEA2-0E3AE19BD5D0}" type="datetimeFigureOut">
               <a:rPr lang="fr-FR" smtClean="0"/>
-              <a:t>01/11/2023</a:t>
+              <a:t>04/11/2023</a:t>
             </a:fld>
             <a:endParaRPr lang="fr-FR"/>
           </a:p>
@@ -4127,6 +4135,1363 @@
 </p:sld>
 </file>
 
+<file path=ppt/slides/slide2.xml><?xml version="1.0" encoding="utf-8"?>
+<p:sld xmlns:a="http://schemas.openxmlformats.org/drawingml/2006/main" xmlns:r="http://schemas.openxmlformats.org/officeDocument/2006/relationships" xmlns:p="http://schemas.openxmlformats.org/presentationml/2006/main">
+  <p:cSld>
+    <p:spTree>
+      <p:nvGrpSpPr>
+        <p:cNvPr id="1" name=""/>
+        <p:cNvGrpSpPr/>
+        <p:nvPr/>
+      </p:nvGrpSpPr>
+      <p:grpSpPr>
+        <a:xfrm>
+          <a:off x="0" y="0"/>
+          <a:ext cx="0" cy="0"/>
+          <a:chOff x="0" y="0"/>
+          <a:chExt cx="0" cy="0"/>
+        </a:xfrm>
+      </p:grpSpPr>
+      <p:pic>
+        <p:nvPicPr>
+          <p:cNvPr id="1026" name="Picture 2" descr="WeMos D1 mini V4.0 - Module Wi-Fi - Opencircuit">
+            <a:extLst>
+              <a:ext uri="{FF2B5EF4-FFF2-40B4-BE49-F238E27FC236}">
+                <a16:creationId xmlns:a16="http://schemas.microsoft.com/office/drawing/2014/main" id="{F19AA317-E23D-00E4-F461-E0AEAAE43135}"/>
+              </a:ext>
+            </a:extLst>
+          </p:cNvPr>
+          <p:cNvPicPr>
+            <a:picLocks noChangeAspect="1" noChangeArrowheads="1"/>
+          </p:cNvPicPr>
+          <p:nvPr/>
+        </p:nvPicPr>
+        <p:blipFill>
+          <a:blip r:embed="rId2">
+            <a:extLst>
+              <a:ext uri="{28A0092B-C50C-407E-A947-70E740481C1C}">
+                <a14:useLocalDpi xmlns:a14="http://schemas.microsoft.com/office/drawing/2010/main" val="0"/>
+              </a:ext>
+            </a:extLst>
+          </a:blip>
+          <a:srcRect/>
+          <a:stretch>
+            <a:fillRect/>
+          </a:stretch>
+        </p:blipFill>
+        <p:spPr bwMode="auto">
+          <a:xfrm>
+            <a:off x="695057" y="1031417"/>
+            <a:ext cx="6398366" cy="3602365"/>
+          </a:xfrm>
+          <a:prstGeom prst="rect">
+            <a:avLst/>
+          </a:prstGeom>
+          <a:noFill/>
+          <a:extLst>
+            <a:ext uri="{909E8E84-426E-40DD-AFC4-6F175D3DCCD1}">
+              <a14:hiddenFill xmlns:a14="http://schemas.microsoft.com/office/drawing/2010/main">
+                <a:solidFill>
+                  <a:srgbClr val="FFFFFF"/>
+                </a:solidFill>
+              </a14:hiddenFill>
+            </a:ext>
+          </a:extLst>
+        </p:spPr>
+      </p:pic>
+      <p:pic>
+        <p:nvPicPr>
+          <p:cNvPr id="1028" name="Picture 4" descr="Standard Active Buzzer Module For Arduino 3.5-5.5V">
+            <a:extLst>
+              <a:ext uri="{FF2B5EF4-FFF2-40B4-BE49-F238E27FC236}">
+                <a16:creationId xmlns:a16="http://schemas.microsoft.com/office/drawing/2014/main" id="{2FDAA19B-290F-912C-FB7B-7DA7E721C244}"/>
+              </a:ext>
+            </a:extLst>
+          </p:cNvPr>
+          <p:cNvPicPr>
+            <a:picLocks noChangeAspect="1" noChangeArrowheads="1"/>
+          </p:cNvPicPr>
+          <p:nvPr/>
+        </p:nvPicPr>
+        <p:blipFill>
+          <a:blip r:embed="rId3">
+            <a:extLst>
+              <a:ext uri="{28A0092B-C50C-407E-A947-70E740481C1C}">
+                <a14:useLocalDpi xmlns:a14="http://schemas.microsoft.com/office/drawing/2010/main" val="0"/>
+              </a:ext>
+            </a:extLst>
+          </a:blip>
+          <a:srcRect/>
+          <a:stretch>
+            <a:fillRect/>
+          </a:stretch>
+        </p:blipFill>
+        <p:spPr bwMode="auto">
+          <a:xfrm>
+            <a:off x="7992762" y="1031417"/>
+            <a:ext cx="1636584" cy="1636584"/>
+          </a:xfrm>
+          <a:prstGeom prst="rect">
+            <a:avLst/>
+          </a:prstGeom>
+          <a:noFill/>
+          <a:extLst>
+            <a:ext uri="{909E8E84-426E-40DD-AFC4-6F175D3DCCD1}">
+              <a14:hiddenFill xmlns:a14="http://schemas.microsoft.com/office/drawing/2010/main">
+                <a:solidFill>
+                  <a:srgbClr val="FFFFFF"/>
+                </a:solidFill>
+              </a14:hiddenFill>
+            </a:ext>
+          </a:extLst>
+        </p:spPr>
+      </p:pic>
+      <p:cxnSp>
+        <p:nvCxnSpPr>
+          <p:cNvPr id="5" name="Connecteur droit 4">
+            <a:extLst>
+              <a:ext uri="{FF2B5EF4-FFF2-40B4-BE49-F238E27FC236}">
+                <a16:creationId xmlns:a16="http://schemas.microsoft.com/office/drawing/2014/main" id="{85BBFD37-BF79-4EF9-FB09-9ACB8A24EF97}"/>
+              </a:ext>
+            </a:extLst>
+          </p:cNvPr>
+          <p:cNvCxnSpPr>
+            <a:cxnSpLocks/>
+          </p:cNvCxnSpPr>
+          <p:nvPr/>
+        </p:nvCxnSpPr>
+        <p:spPr>
+          <a:xfrm>
+            <a:off x="8633964" y="2311778"/>
+            <a:ext cx="0" cy="554918"/>
+          </a:xfrm>
+          <a:prstGeom prst="line">
+            <a:avLst/>
+          </a:prstGeom>
+          <a:ln w="38100">
+            <a:solidFill>
+              <a:srgbClr val="FF0000"/>
+            </a:solidFill>
+          </a:ln>
+        </p:spPr>
+        <p:style>
+          <a:lnRef idx="1">
+            <a:schemeClr val="accent1"/>
+          </a:lnRef>
+          <a:fillRef idx="0">
+            <a:schemeClr val="accent1"/>
+          </a:fillRef>
+          <a:effectRef idx="0">
+            <a:schemeClr val="accent1"/>
+          </a:effectRef>
+          <a:fontRef idx="minor">
+            <a:schemeClr val="tx1"/>
+          </a:fontRef>
+        </p:style>
+      </p:cxnSp>
+      <p:cxnSp>
+        <p:nvCxnSpPr>
+          <p:cNvPr id="7" name="Connecteur droit 6">
+            <a:extLst>
+              <a:ext uri="{FF2B5EF4-FFF2-40B4-BE49-F238E27FC236}">
+                <a16:creationId xmlns:a16="http://schemas.microsoft.com/office/drawing/2014/main" id="{1D15D675-7785-4BF8-5877-C1B061009227}"/>
+              </a:ext>
+            </a:extLst>
+          </p:cNvPr>
+          <p:cNvCxnSpPr>
+            <a:cxnSpLocks/>
+          </p:cNvCxnSpPr>
+          <p:nvPr/>
+        </p:nvCxnSpPr>
+        <p:spPr>
+          <a:xfrm flipH="1">
+            <a:off x="6014545" y="2866696"/>
+            <a:ext cx="2619419" cy="0"/>
+          </a:xfrm>
+          <a:prstGeom prst="line">
+            <a:avLst/>
+          </a:prstGeom>
+          <a:ln w="38100">
+            <a:solidFill>
+              <a:srgbClr val="FF0000"/>
+            </a:solidFill>
+          </a:ln>
+        </p:spPr>
+        <p:style>
+          <a:lnRef idx="1">
+            <a:schemeClr val="accent1"/>
+          </a:lnRef>
+          <a:fillRef idx="0">
+            <a:schemeClr val="accent1"/>
+          </a:fillRef>
+          <a:effectRef idx="0">
+            <a:schemeClr val="accent1"/>
+          </a:effectRef>
+          <a:fontRef idx="minor">
+            <a:schemeClr val="tx1"/>
+          </a:fontRef>
+        </p:style>
+      </p:cxnSp>
+      <p:sp>
+        <p:nvSpPr>
+          <p:cNvPr id="10" name="ZoneTexte 9">
+            <a:extLst>
+              <a:ext uri="{FF2B5EF4-FFF2-40B4-BE49-F238E27FC236}">
+                <a16:creationId xmlns:a16="http://schemas.microsoft.com/office/drawing/2014/main" id="{EB60BB7E-099B-8036-1981-FA3783DDA1FA}"/>
+              </a:ext>
+            </a:extLst>
+          </p:cNvPr>
+          <p:cNvSpPr txBox="1"/>
+          <p:nvPr/>
+        </p:nvSpPr>
+        <p:spPr>
+          <a:xfrm>
+            <a:off x="8174421" y="1099611"/>
+            <a:ext cx="364202" cy="523220"/>
+          </a:xfrm>
+          <a:prstGeom prst="rect">
+            <a:avLst/>
+          </a:prstGeom>
+          <a:noFill/>
+        </p:spPr>
+        <p:txBody>
+          <a:bodyPr wrap="none" rtlCol="0">
+            <a:spAutoFit/>
+          </a:bodyPr>
+          <a:lstStyle/>
+          <a:p>
+            <a:r>
+              <a:rPr lang="fr-FR" sz="2800" dirty="0">
+                <a:solidFill>
+                  <a:srgbClr val="FF0000"/>
+                </a:solidFill>
+              </a:rPr>
+              <a:t>+</a:t>
+            </a:r>
+          </a:p>
+        </p:txBody>
+      </p:sp>
+      <p:cxnSp>
+        <p:nvCxnSpPr>
+          <p:cNvPr id="11" name="Connecteur droit 10">
+            <a:extLst>
+              <a:ext uri="{FF2B5EF4-FFF2-40B4-BE49-F238E27FC236}">
+                <a16:creationId xmlns:a16="http://schemas.microsoft.com/office/drawing/2014/main" id="{C0D77A3D-C29D-E54A-A5F5-628993AE32FC}"/>
+              </a:ext>
+            </a:extLst>
+          </p:cNvPr>
+          <p:cNvCxnSpPr>
+            <a:cxnSpLocks/>
+          </p:cNvCxnSpPr>
+          <p:nvPr/>
+        </p:nvCxnSpPr>
+        <p:spPr>
+          <a:xfrm>
+            <a:off x="9114812" y="2311778"/>
+            <a:ext cx="0" cy="1117222"/>
+          </a:xfrm>
+          <a:prstGeom prst="line">
+            <a:avLst/>
+          </a:prstGeom>
+          <a:ln w="38100">
+            <a:solidFill>
+              <a:schemeClr val="tx1"/>
+            </a:solidFill>
+          </a:ln>
+        </p:spPr>
+        <p:style>
+          <a:lnRef idx="1">
+            <a:schemeClr val="accent1"/>
+          </a:lnRef>
+          <a:fillRef idx="0">
+            <a:schemeClr val="accent1"/>
+          </a:fillRef>
+          <a:effectRef idx="0">
+            <a:schemeClr val="accent1"/>
+          </a:effectRef>
+          <a:fontRef idx="minor">
+            <a:schemeClr val="tx1"/>
+          </a:fontRef>
+        </p:style>
+      </p:cxnSp>
+      <p:cxnSp>
+        <p:nvCxnSpPr>
+          <p:cNvPr id="12" name="Connecteur droit 11">
+            <a:extLst>
+              <a:ext uri="{FF2B5EF4-FFF2-40B4-BE49-F238E27FC236}">
+                <a16:creationId xmlns:a16="http://schemas.microsoft.com/office/drawing/2014/main" id="{E596E5EC-AE15-8D6D-71F2-70B7A271DC7A}"/>
+              </a:ext>
+            </a:extLst>
+          </p:cNvPr>
+          <p:cNvCxnSpPr>
+            <a:cxnSpLocks/>
+          </p:cNvCxnSpPr>
+          <p:nvPr/>
+        </p:nvCxnSpPr>
+        <p:spPr>
+          <a:xfrm flipH="1">
+            <a:off x="6014545" y="3413234"/>
+            <a:ext cx="3100267" cy="0"/>
+          </a:xfrm>
+          <a:prstGeom prst="line">
+            <a:avLst/>
+          </a:prstGeom>
+          <a:ln w="38100">
+            <a:solidFill>
+              <a:schemeClr val="tx1"/>
+            </a:solidFill>
+          </a:ln>
+        </p:spPr>
+        <p:style>
+          <a:lnRef idx="1">
+            <a:schemeClr val="accent1"/>
+          </a:lnRef>
+          <a:fillRef idx="0">
+            <a:schemeClr val="accent1"/>
+          </a:fillRef>
+          <a:effectRef idx="0">
+            <a:schemeClr val="accent1"/>
+          </a:effectRef>
+          <a:fontRef idx="minor">
+            <a:schemeClr val="tx1"/>
+          </a:fontRef>
+        </p:style>
+      </p:cxnSp>
+    </p:spTree>
+    <p:extLst>
+      <p:ext uri="{BB962C8B-B14F-4D97-AF65-F5344CB8AC3E}">
+        <p14:creationId xmlns:p14="http://schemas.microsoft.com/office/powerpoint/2010/main" val="1694416802"/>
+      </p:ext>
+    </p:extLst>
+  </p:cSld>
+  <p:clrMapOvr>
+    <a:masterClrMapping/>
+  </p:clrMapOvr>
+</p:sld>
+</file>
+
+<file path=ppt/slides/slide3.xml><?xml version="1.0" encoding="utf-8"?>
+<p:sld xmlns:a="http://schemas.openxmlformats.org/drawingml/2006/main" xmlns:r="http://schemas.openxmlformats.org/officeDocument/2006/relationships" xmlns:p="http://schemas.openxmlformats.org/presentationml/2006/main">
+  <p:cSld>
+    <p:spTree>
+      <p:nvGrpSpPr>
+        <p:cNvPr id="1" name=""/>
+        <p:cNvGrpSpPr/>
+        <p:nvPr/>
+      </p:nvGrpSpPr>
+      <p:grpSpPr>
+        <a:xfrm>
+          <a:off x="0" y="0"/>
+          <a:ext cx="0" cy="0"/>
+          <a:chOff x="0" y="0"/>
+          <a:chExt cx="0" cy="0"/>
+        </a:xfrm>
+      </p:grpSpPr>
+      <p:pic>
+        <p:nvPicPr>
+          <p:cNvPr id="2054" name="Picture 6" descr="220 Ohm Resistor">
+            <a:extLst>
+              <a:ext uri="{FF2B5EF4-FFF2-40B4-BE49-F238E27FC236}">
+                <a16:creationId xmlns:a16="http://schemas.microsoft.com/office/drawing/2014/main" id="{058294F4-DBEC-D9DA-13E4-C09C6755D05C}"/>
+              </a:ext>
+            </a:extLst>
+          </p:cNvPr>
+          <p:cNvPicPr>
+            <a:picLocks noChangeAspect="1" noChangeArrowheads="1"/>
+          </p:cNvPicPr>
+          <p:nvPr/>
+        </p:nvPicPr>
+        <p:blipFill>
+          <a:blip r:embed="rId2">
+            <a:extLst>
+              <a:ext uri="{28A0092B-C50C-407E-A947-70E740481C1C}">
+                <a14:useLocalDpi xmlns:a14="http://schemas.microsoft.com/office/drawing/2010/main" val="0"/>
+              </a:ext>
+            </a:extLst>
+          </a:blip>
+          <a:srcRect/>
+          <a:stretch>
+            <a:fillRect/>
+          </a:stretch>
+        </p:blipFill>
+        <p:spPr bwMode="auto">
+          <a:xfrm>
+            <a:off x="7019812" y="2970269"/>
+            <a:ext cx="918344" cy="266484"/>
+          </a:xfrm>
+          <a:prstGeom prst="rect">
+            <a:avLst/>
+          </a:prstGeom>
+          <a:noFill/>
+          <a:extLst>
+            <a:ext uri="{909E8E84-426E-40DD-AFC4-6F175D3DCCD1}">
+              <a14:hiddenFill xmlns:a14="http://schemas.microsoft.com/office/drawing/2010/main">
+                <a:solidFill>
+                  <a:srgbClr val="FFFFFF"/>
+                </a:solidFill>
+              </a14:hiddenFill>
+            </a:ext>
+          </a:extLst>
+        </p:spPr>
+      </p:pic>
+      <p:pic>
+        <p:nvPicPr>
+          <p:cNvPr id="4" name="Picture 2" descr="WeMos D1 mini V4.0 - Module Wi-Fi - Opencircuit">
+            <a:extLst>
+              <a:ext uri="{FF2B5EF4-FFF2-40B4-BE49-F238E27FC236}">
+                <a16:creationId xmlns:a16="http://schemas.microsoft.com/office/drawing/2014/main" id="{EAD66363-C9FC-A864-7E8C-640EEDCE7377}"/>
+              </a:ext>
+            </a:extLst>
+          </p:cNvPr>
+          <p:cNvPicPr>
+            <a:picLocks noChangeAspect="1" noChangeArrowheads="1"/>
+          </p:cNvPicPr>
+          <p:nvPr/>
+        </p:nvPicPr>
+        <p:blipFill>
+          <a:blip r:embed="rId3">
+            <a:extLst>
+              <a:ext uri="{28A0092B-C50C-407E-A947-70E740481C1C}">
+                <a14:useLocalDpi xmlns:a14="http://schemas.microsoft.com/office/drawing/2010/main" val="0"/>
+              </a:ext>
+            </a:extLst>
+          </a:blip>
+          <a:srcRect/>
+          <a:stretch>
+            <a:fillRect/>
+          </a:stretch>
+        </p:blipFill>
+        <p:spPr bwMode="auto">
+          <a:xfrm>
+            <a:off x="695057" y="1031417"/>
+            <a:ext cx="6398366" cy="3602365"/>
+          </a:xfrm>
+          <a:prstGeom prst="rect">
+            <a:avLst/>
+          </a:prstGeom>
+          <a:noFill/>
+          <a:extLst>
+            <a:ext uri="{909E8E84-426E-40DD-AFC4-6F175D3DCCD1}">
+              <a14:hiddenFill xmlns:a14="http://schemas.microsoft.com/office/drawing/2010/main">
+                <a:solidFill>
+                  <a:srgbClr val="FFFFFF"/>
+                </a:solidFill>
+              </a14:hiddenFill>
+            </a:ext>
+          </a:extLst>
+        </p:spPr>
+      </p:pic>
+      <p:cxnSp>
+        <p:nvCxnSpPr>
+          <p:cNvPr id="6" name="Connecteur droit 5">
+            <a:extLst>
+              <a:ext uri="{FF2B5EF4-FFF2-40B4-BE49-F238E27FC236}">
+                <a16:creationId xmlns:a16="http://schemas.microsoft.com/office/drawing/2014/main" id="{EAA6E41E-F295-B4C6-AE28-D85FBDADF7D4}"/>
+              </a:ext>
+            </a:extLst>
+          </p:cNvPr>
+          <p:cNvCxnSpPr>
+            <a:cxnSpLocks/>
+          </p:cNvCxnSpPr>
+          <p:nvPr/>
+        </p:nvCxnSpPr>
+        <p:spPr>
+          <a:xfrm>
+            <a:off x="8551897" y="2334085"/>
+            <a:ext cx="0" cy="765048"/>
+          </a:xfrm>
+          <a:prstGeom prst="line">
+            <a:avLst/>
+          </a:prstGeom>
+          <a:ln w="38100">
+            <a:solidFill>
+              <a:srgbClr val="FF0000"/>
+            </a:solidFill>
+          </a:ln>
+        </p:spPr>
+        <p:style>
+          <a:lnRef idx="1">
+            <a:schemeClr val="accent1"/>
+          </a:lnRef>
+          <a:fillRef idx="0">
+            <a:schemeClr val="accent1"/>
+          </a:fillRef>
+          <a:effectRef idx="0">
+            <a:schemeClr val="accent1"/>
+          </a:effectRef>
+          <a:fontRef idx="minor">
+            <a:schemeClr val="tx1"/>
+          </a:fontRef>
+        </p:style>
+      </p:cxnSp>
+      <p:cxnSp>
+        <p:nvCxnSpPr>
+          <p:cNvPr id="7" name="Connecteur droit 6">
+            <a:extLst>
+              <a:ext uri="{FF2B5EF4-FFF2-40B4-BE49-F238E27FC236}">
+                <a16:creationId xmlns:a16="http://schemas.microsoft.com/office/drawing/2014/main" id="{7600A678-828B-4E5E-873A-5DFB07D980FD}"/>
+              </a:ext>
+            </a:extLst>
+          </p:cNvPr>
+          <p:cNvCxnSpPr>
+            <a:cxnSpLocks/>
+          </p:cNvCxnSpPr>
+          <p:nvPr/>
+        </p:nvCxnSpPr>
+        <p:spPr>
+          <a:xfrm flipH="1">
+            <a:off x="6482862" y="3109000"/>
+            <a:ext cx="685813" cy="0"/>
+          </a:xfrm>
+          <a:prstGeom prst="line">
+            <a:avLst/>
+          </a:prstGeom>
+          <a:ln w="38100">
+            <a:solidFill>
+              <a:srgbClr val="FF0000"/>
+            </a:solidFill>
+          </a:ln>
+        </p:spPr>
+        <p:style>
+          <a:lnRef idx="1">
+            <a:schemeClr val="accent1"/>
+          </a:lnRef>
+          <a:fillRef idx="0">
+            <a:schemeClr val="accent1"/>
+          </a:fillRef>
+          <a:effectRef idx="0">
+            <a:schemeClr val="accent1"/>
+          </a:effectRef>
+          <a:fontRef idx="minor">
+            <a:schemeClr val="tx1"/>
+          </a:fontRef>
+        </p:style>
+      </p:cxnSp>
+      <p:cxnSp>
+        <p:nvCxnSpPr>
+          <p:cNvPr id="9" name="Connecteur droit 8">
+            <a:extLst>
+              <a:ext uri="{FF2B5EF4-FFF2-40B4-BE49-F238E27FC236}">
+                <a16:creationId xmlns:a16="http://schemas.microsoft.com/office/drawing/2014/main" id="{22103B2F-15E6-9885-7E3C-3B866055F25B}"/>
+              </a:ext>
+            </a:extLst>
+          </p:cNvPr>
+          <p:cNvCxnSpPr>
+            <a:cxnSpLocks/>
+          </p:cNvCxnSpPr>
+          <p:nvPr/>
+        </p:nvCxnSpPr>
+        <p:spPr>
+          <a:xfrm>
+            <a:off x="8640028" y="2156033"/>
+            <a:ext cx="0" cy="1234178"/>
+          </a:xfrm>
+          <a:prstGeom prst="line">
+            <a:avLst/>
+          </a:prstGeom>
+          <a:ln w="38100">
+            <a:solidFill>
+              <a:schemeClr val="tx1"/>
+            </a:solidFill>
+          </a:ln>
+        </p:spPr>
+        <p:style>
+          <a:lnRef idx="1">
+            <a:schemeClr val="accent1"/>
+          </a:lnRef>
+          <a:fillRef idx="0">
+            <a:schemeClr val="accent1"/>
+          </a:fillRef>
+          <a:effectRef idx="0">
+            <a:schemeClr val="accent1"/>
+          </a:effectRef>
+          <a:fontRef idx="minor">
+            <a:schemeClr val="tx1"/>
+          </a:fontRef>
+        </p:style>
+      </p:cxnSp>
+      <p:cxnSp>
+        <p:nvCxnSpPr>
+          <p:cNvPr id="10" name="Connecteur droit 9">
+            <a:extLst>
+              <a:ext uri="{FF2B5EF4-FFF2-40B4-BE49-F238E27FC236}">
+                <a16:creationId xmlns:a16="http://schemas.microsoft.com/office/drawing/2014/main" id="{3840A033-585D-1855-5361-512F4BD78704}"/>
+              </a:ext>
+            </a:extLst>
+          </p:cNvPr>
+          <p:cNvCxnSpPr>
+            <a:cxnSpLocks/>
+          </p:cNvCxnSpPr>
+          <p:nvPr/>
+        </p:nvCxnSpPr>
+        <p:spPr>
+          <a:xfrm flipH="1">
+            <a:off x="6011256" y="3373766"/>
+            <a:ext cx="2649231" cy="0"/>
+          </a:xfrm>
+          <a:prstGeom prst="line">
+            <a:avLst/>
+          </a:prstGeom>
+          <a:ln w="38100">
+            <a:solidFill>
+              <a:schemeClr val="tx1"/>
+            </a:solidFill>
+          </a:ln>
+        </p:spPr>
+        <p:style>
+          <a:lnRef idx="1">
+            <a:schemeClr val="accent1"/>
+          </a:lnRef>
+          <a:fillRef idx="0">
+            <a:schemeClr val="accent1"/>
+          </a:fillRef>
+          <a:effectRef idx="0">
+            <a:schemeClr val="accent1"/>
+          </a:effectRef>
+          <a:fontRef idx="minor">
+            <a:schemeClr val="tx1"/>
+          </a:fontRef>
+        </p:style>
+      </p:cxnSp>
+      <p:pic>
+        <p:nvPicPr>
+          <p:cNvPr id="2052" name="Picture 4" descr="Gespenstisch Erfindung Dreh dich um single led arduino freie Stelle Schöne  Frau Leder">
+            <a:extLst>
+              <a:ext uri="{FF2B5EF4-FFF2-40B4-BE49-F238E27FC236}">
+                <a16:creationId xmlns:a16="http://schemas.microsoft.com/office/drawing/2014/main" id="{0D2CC638-1FB2-0ED0-B20F-52541277C898}"/>
+              </a:ext>
+            </a:extLst>
+          </p:cNvPr>
+          <p:cNvPicPr>
+            <a:picLocks noChangeAspect="1" noChangeArrowheads="1"/>
+          </p:cNvPicPr>
+          <p:nvPr/>
+        </p:nvPicPr>
+        <p:blipFill>
+          <a:blip r:embed="rId4">
+            <a:extLst>
+              <a:ext uri="{28A0092B-C50C-407E-A947-70E740481C1C}">
+                <a14:useLocalDpi xmlns:a14="http://schemas.microsoft.com/office/drawing/2010/main" val="0"/>
+              </a:ext>
+            </a:extLst>
+          </a:blip>
+          <a:srcRect/>
+          <a:stretch>
+            <a:fillRect/>
+          </a:stretch>
+        </p:blipFill>
+        <p:spPr bwMode="auto">
+          <a:xfrm>
+            <a:off x="7781519" y="1150257"/>
+            <a:ext cx="1607444" cy="1205583"/>
+          </a:xfrm>
+          <a:prstGeom prst="rect">
+            <a:avLst/>
+          </a:prstGeom>
+          <a:noFill/>
+          <a:extLst>
+            <a:ext uri="{909E8E84-426E-40DD-AFC4-6F175D3DCCD1}">
+              <a14:hiddenFill xmlns:a14="http://schemas.microsoft.com/office/drawing/2010/main">
+                <a:solidFill>
+                  <a:srgbClr val="FFFFFF"/>
+                </a:solidFill>
+              </a14:hiddenFill>
+            </a:ext>
+          </a:extLst>
+        </p:spPr>
+      </p:pic>
+      <p:sp>
+        <p:nvSpPr>
+          <p:cNvPr id="11" name="ZoneTexte 10">
+            <a:extLst>
+              <a:ext uri="{FF2B5EF4-FFF2-40B4-BE49-F238E27FC236}">
+                <a16:creationId xmlns:a16="http://schemas.microsoft.com/office/drawing/2014/main" id="{01707A80-F9C6-40AB-68EE-C5FC6340E226}"/>
+              </a:ext>
+            </a:extLst>
+          </p:cNvPr>
+          <p:cNvSpPr txBox="1"/>
+          <p:nvPr/>
+        </p:nvSpPr>
+        <p:spPr>
+          <a:xfrm>
+            <a:off x="7018102" y="2724237"/>
+            <a:ext cx="984565" cy="261610"/>
+          </a:xfrm>
+          <a:prstGeom prst="rect">
+            <a:avLst/>
+          </a:prstGeom>
+          <a:noFill/>
+        </p:spPr>
+        <p:txBody>
+          <a:bodyPr wrap="none" rtlCol="0">
+            <a:spAutoFit/>
+          </a:bodyPr>
+          <a:lstStyle/>
+          <a:p>
+            <a:r>
+              <a:rPr lang="el-GR" sz="1100" b="0" i="0" u="none" strike="noStrike" dirty="0">
+                <a:solidFill>
+                  <a:srgbClr val="5C5962"/>
+                </a:solidFill>
+                <a:effectLst/>
+                <a:latin typeface="system-ui"/>
+              </a:rPr>
+              <a:t>220Ω </a:t>
+            </a:r>
+            <a:r>
+              <a:rPr lang="fr-FR" sz="1100" b="0" i="0" u="none" strike="noStrike" dirty="0" err="1">
+                <a:solidFill>
+                  <a:srgbClr val="5C5962"/>
+                </a:solidFill>
+                <a:effectLst/>
+                <a:latin typeface="system-ui"/>
+              </a:rPr>
+              <a:t>Resistor</a:t>
+            </a:r>
+            <a:endParaRPr lang="fr-FR" sz="1100" dirty="0"/>
+          </a:p>
+        </p:txBody>
+      </p:sp>
+      <p:cxnSp>
+        <p:nvCxnSpPr>
+          <p:cNvPr id="13" name="Connecteur droit 12">
+            <a:extLst>
+              <a:ext uri="{FF2B5EF4-FFF2-40B4-BE49-F238E27FC236}">
+                <a16:creationId xmlns:a16="http://schemas.microsoft.com/office/drawing/2014/main" id="{03A3CD48-8701-0504-591F-062387A49003}"/>
+              </a:ext>
+            </a:extLst>
+          </p:cNvPr>
+          <p:cNvCxnSpPr>
+            <a:cxnSpLocks/>
+          </p:cNvCxnSpPr>
+          <p:nvPr/>
+        </p:nvCxnSpPr>
+        <p:spPr>
+          <a:xfrm flipH="1">
+            <a:off x="7781519" y="3109000"/>
+            <a:ext cx="787964" cy="0"/>
+          </a:xfrm>
+          <a:prstGeom prst="line">
+            <a:avLst/>
+          </a:prstGeom>
+          <a:ln w="38100">
+            <a:solidFill>
+              <a:srgbClr val="FF0000"/>
+            </a:solidFill>
+          </a:ln>
+        </p:spPr>
+        <p:style>
+          <a:lnRef idx="1">
+            <a:schemeClr val="accent1"/>
+          </a:lnRef>
+          <a:fillRef idx="0">
+            <a:schemeClr val="accent1"/>
+          </a:fillRef>
+          <a:effectRef idx="0">
+            <a:schemeClr val="accent1"/>
+          </a:effectRef>
+          <a:fontRef idx="minor">
+            <a:schemeClr val="tx1"/>
+          </a:fontRef>
+        </p:style>
+      </p:cxnSp>
+    </p:spTree>
+    <p:extLst>
+      <p:ext uri="{BB962C8B-B14F-4D97-AF65-F5344CB8AC3E}">
+        <p14:creationId xmlns:p14="http://schemas.microsoft.com/office/powerpoint/2010/main" val="1292994268"/>
+      </p:ext>
+    </p:extLst>
+  </p:cSld>
+  <p:clrMapOvr>
+    <a:masterClrMapping/>
+  </p:clrMapOvr>
+</p:sld>
+</file>
+
+<file path=ppt/slides/slide4.xml><?xml version="1.0" encoding="utf-8"?>
+<p:sld xmlns:a="http://schemas.openxmlformats.org/drawingml/2006/main" xmlns:r="http://schemas.openxmlformats.org/officeDocument/2006/relationships" xmlns:p="http://schemas.openxmlformats.org/presentationml/2006/main">
+  <p:cSld>
+    <p:spTree>
+      <p:nvGrpSpPr>
+        <p:cNvPr id="1" name=""/>
+        <p:cNvGrpSpPr/>
+        <p:nvPr/>
+      </p:nvGrpSpPr>
+      <p:grpSpPr>
+        <a:xfrm>
+          <a:off x="0" y="0"/>
+          <a:ext cx="0" cy="0"/>
+          <a:chOff x="0" y="0"/>
+          <a:chExt cx="0" cy="0"/>
+        </a:xfrm>
+      </p:grpSpPr>
+      <p:pic>
+        <p:nvPicPr>
+          <p:cNvPr id="2" name="Picture 2" descr="WeMos D1 mini V4.0 - Module Wi-Fi - Opencircuit">
+            <a:extLst>
+              <a:ext uri="{FF2B5EF4-FFF2-40B4-BE49-F238E27FC236}">
+                <a16:creationId xmlns:a16="http://schemas.microsoft.com/office/drawing/2014/main" id="{CBE9F198-0D43-86FD-49DA-15CB0A2B34C8}"/>
+              </a:ext>
+            </a:extLst>
+          </p:cNvPr>
+          <p:cNvPicPr>
+            <a:picLocks noChangeAspect="1" noChangeArrowheads="1"/>
+          </p:cNvPicPr>
+          <p:nvPr/>
+        </p:nvPicPr>
+        <p:blipFill>
+          <a:blip r:embed="rId2">
+            <a:extLst>
+              <a:ext uri="{28A0092B-C50C-407E-A947-70E740481C1C}">
+                <a14:useLocalDpi xmlns:a14="http://schemas.microsoft.com/office/drawing/2010/main" val="0"/>
+              </a:ext>
+            </a:extLst>
+          </a:blip>
+          <a:srcRect/>
+          <a:stretch>
+            <a:fillRect/>
+          </a:stretch>
+        </p:blipFill>
+        <p:spPr bwMode="auto">
+          <a:xfrm>
+            <a:off x="695057" y="1031417"/>
+            <a:ext cx="6398366" cy="3602365"/>
+          </a:xfrm>
+          <a:prstGeom prst="rect">
+            <a:avLst/>
+          </a:prstGeom>
+          <a:noFill/>
+          <a:extLst>
+            <a:ext uri="{909E8E84-426E-40DD-AFC4-6F175D3DCCD1}">
+              <a14:hiddenFill xmlns:a14="http://schemas.microsoft.com/office/drawing/2010/main">
+                <a:solidFill>
+                  <a:srgbClr val="FFFFFF"/>
+                </a:solidFill>
+              </a14:hiddenFill>
+            </a:ext>
+          </a:extLst>
+        </p:spPr>
+      </p:pic>
+      <p:pic>
+        <p:nvPicPr>
+          <p:cNvPr id="4" name="Image 3">
+            <a:extLst>
+              <a:ext uri="{FF2B5EF4-FFF2-40B4-BE49-F238E27FC236}">
+                <a16:creationId xmlns:a16="http://schemas.microsoft.com/office/drawing/2014/main" id="{10ADB52E-2458-86AC-0A6A-A869E581F081}"/>
+              </a:ext>
+            </a:extLst>
+          </p:cNvPr>
+          <p:cNvPicPr>
+            <a:picLocks noChangeAspect="1"/>
+          </p:cNvPicPr>
+          <p:nvPr/>
+        </p:nvPicPr>
+        <p:blipFill>
+          <a:blip r:embed="rId3">
+            <a:clrChange>
+              <a:clrFrom>
+                <a:srgbClr val="F8F2EB"/>
+              </a:clrFrom>
+              <a:clrTo>
+                <a:srgbClr val="F8F2EB">
+                  <a:alpha val="0"/>
+                </a:srgbClr>
+              </a:clrTo>
+            </a:clrChange>
+            <a:alphaModFix/>
+          </a:blip>
+          <a:stretch>
+            <a:fillRect/>
+          </a:stretch>
+        </p:blipFill>
+        <p:spPr>
+          <a:xfrm rot="351335">
+            <a:off x="7966919" y="1122341"/>
+            <a:ext cx="1603645" cy="1782551"/>
+          </a:xfrm>
+          <a:prstGeom prst="rect">
+            <a:avLst/>
+          </a:prstGeom>
+        </p:spPr>
+      </p:pic>
+      <p:cxnSp>
+        <p:nvCxnSpPr>
+          <p:cNvPr id="7" name="Connecteur droit 6">
+            <a:extLst>
+              <a:ext uri="{FF2B5EF4-FFF2-40B4-BE49-F238E27FC236}">
+                <a16:creationId xmlns:a16="http://schemas.microsoft.com/office/drawing/2014/main" id="{4594D3BD-C599-1F16-46F3-577E2CC4A278}"/>
+              </a:ext>
+            </a:extLst>
+          </p:cNvPr>
+          <p:cNvCxnSpPr>
+            <a:cxnSpLocks/>
+          </p:cNvCxnSpPr>
+          <p:nvPr/>
+        </p:nvCxnSpPr>
+        <p:spPr>
+          <a:xfrm>
+            <a:off x="7967752" y="2811911"/>
+            <a:ext cx="0" cy="1447614"/>
+          </a:xfrm>
+          <a:prstGeom prst="line">
+            <a:avLst/>
+          </a:prstGeom>
+          <a:ln w="38100">
+            <a:solidFill>
+              <a:srgbClr val="FF0000"/>
+            </a:solidFill>
+          </a:ln>
+        </p:spPr>
+        <p:style>
+          <a:lnRef idx="1">
+            <a:schemeClr val="accent1"/>
+          </a:lnRef>
+          <a:fillRef idx="0">
+            <a:schemeClr val="accent1"/>
+          </a:fillRef>
+          <a:effectRef idx="0">
+            <a:schemeClr val="accent1"/>
+          </a:effectRef>
+          <a:fontRef idx="minor">
+            <a:schemeClr val="tx1"/>
+          </a:fontRef>
+        </p:style>
+      </p:cxnSp>
+      <p:cxnSp>
+        <p:nvCxnSpPr>
+          <p:cNvPr id="8" name="Connecteur droit 7">
+            <a:extLst>
+              <a:ext uri="{FF2B5EF4-FFF2-40B4-BE49-F238E27FC236}">
+                <a16:creationId xmlns:a16="http://schemas.microsoft.com/office/drawing/2014/main" id="{6E050AD5-22E8-F95A-36DC-8D6A56DDDDCC}"/>
+              </a:ext>
+            </a:extLst>
+          </p:cNvPr>
+          <p:cNvCxnSpPr>
+            <a:cxnSpLocks/>
+          </p:cNvCxnSpPr>
+          <p:nvPr/>
+        </p:nvCxnSpPr>
+        <p:spPr>
+          <a:xfrm flipH="1">
+            <a:off x="7194360" y="4259525"/>
+            <a:ext cx="773392" cy="0"/>
+          </a:xfrm>
+          <a:prstGeom prst="line">
+            <a:avLst/>
+          </a:prstGeom>
+          <a:ln w="38100" cap="sq">
+            <a:solidFill>
+              <a:srgbClr val="FF0000"/>
+            </a:solidFill>
+          </a:ln>
+        </p:spPr>
+        <p:style>
+          <a:lnRef idx="1">
+            <a:schemeClr val="accent1"/>
+          </a:lnRef>
+          <a:fillRef idx="0">
+            <a:schemeClr val="accent1"/>
+          </a:fillRef>
+          <a:effectRef idx="0">
+            <a:schemeClr val="accent1"/>
+          </a:effectRef>
+          <a:fontRef idx="minor">
+            <a:schemeClr val="tx1"/>
+          </a:fontRef>
+        </p:style>
+      </p:cxnSp>
+      <p:cxnSp>
+        <p:nvCxnSpPr>
+          <p:cNvPr id="9" name="Connecteur droit 8">
+            <a:extLst>
+              <a:ext uri="{FF2B5EF4-FFF2-40B4-BE49-F238E27FC236}">
+                <a16:creationId xmlns:a16="http://schemas.microsoft.com/office/drawing/2014/main" id="{A3C9D7F9-56ED-0393-BC2C-E9A21950CD20}"/>
+              </a:ext>
+            </a:extLst>
+          </p:cNvPr>
+          <p:cNvCxnSpPr>
+            <a:cxnSpLocks/>
+          </p:cNvCxnSpPr>
+          <p:nvPr/>
+        </p:nvCxnSpPr>
+        <p:spPr>
+          <a:xfrm flipH="1">
+            <a:off x="7881642" y="2832599"/>
+            <a:ext cx="27781" cy="1311804"/>
+          </a:xfrm>
+          <a:prstGeom prst="line">
+            <a:avLst/>
+          </a:prstGeom>
+          <a:ln w="38100" cap="sq">
+            <a:solidFill>
+              <a:schemeClr val="tx1"/>
+            </a:solidFill>
+          </a:ln>
+        </p:spPr>
+        <p:style>
+          <a:lnRef idx="1">
+            <a:schemeClr val="accent1"/>
+          </a:lnRef>
+          <a:fillRef idx="0">
+            <a:schemeClr val="accent1"/>
+          </a:fillRef>
+          <a:effectRef idx="0">
+            <a:schemeClr val="accent1"/>
+          </a:effectRef>
+          <a:fontRef idx="minor">
+            <a:schemeClr val="tx1"/>
+          </a:fontRef>
+        </p:style>
+      </p:cxnSp>
+      <p:cxnSp>
+        <p:nvCxnSpPr>
+          <p:cNvPr id="13" name="Connecteur droit 12">
+            <a:extLst>
+              <a:ext uri="{FF2B5EF4-FFF2-40B4-BE49-F238E27FC236}">
+                <a16:creationId xmlns:a16="http://schemas.microsoft.com/office/drawing/2014/main" id="{DD9BDDF2-DA33-8CF9-9747-A411B830C988}"/>
+              </a:ext>
+            </a:extLst>
+          </p:cNvPr>
+          <p:cNvCxnSpPr>
+            <a:cxnSpLocks/>
+          </p:cNvCxnSpPr>
+          <p:nvPr/>
+        </p:nvCxnSpPr>
+        <p:spPr>
+          <a:xfrm>
+            <a:off x="8032782" y="2811911"/>
+            <a:ext cx="0" cy="1821871"/>
+          </a:xfrm>
+          <a:prstGeom prst="line">
+            <a:avLst/>
+          </a:prstGeom>
+          <a:ln w="38100">
+            <a:solidFill>
+              <a:schemeClr val="accent4">
+                <a:lumMod val="60000"/>
+                <a:lumOff val="40000"/>
+              </a:schemeClr>
+            </a:solidFill>
+          </a:ln>
+        </p:spPr>
+        <p:style>
+          <a:lnRef idx="1">
+            <a:schemeClr val="accent1"/>
+          </a:lnRef>
+          <a:fillRef idx="0">
+            <a:schemeClr val="accent1"/>
+          </a:fillRef>
+          <a:effectRef idx="0">
+            <a:schemeClr val="accent1"/>
+          </a:effectRef>
+          <a:fontRef idx="minor">
+            <a:schemeClr val="tx1"/>
+          </a:fontRef>
+        </p:style>
+      </p:cxnSp>
+      <p:grpSp>
+        <p:nvGrpSpPr>
+          <p:cNvPr id="16" name="Groupe 15">
+            <a:extLst>
+              <a:ext uri="{FF2B5EF4-FFF2-40B4-BE49-F238E27FC236}">
+                <a16:creationId xmlns:a16="http://schemas.microsoft.com/office/drawing/2014/main" id="{B0D145FC-E581-88D4-69A2-5D31600B203E}"/>
+              </a:ext>
+            </a:extLst>
+          </p:cNvPr>
+          <p:cNvGrpSpPr/>
+          <p:nvPr/>
+        </p:nvGrpSpPr>
+        <p:grpSpPr>
+          <a:xfrm>
+            <a:off x="6850718" y="4039148"/>
+            <a:ext cx="880834" cy="440754"/>
+            <a:chOff x="7835569" y="4032570"/>
+            <a:chExt cx="880834" cy="440754"/>
+          </a:xfrm>
+        </p:grpSpPr>
+        <p:sp>
+          <p:nvSpPr>
+            <p:cNvPr id="14" name="Rectangle : coins arrondis 13">
+              <a:extLst>
+                <a:ext uri="{FF2B5EF4-FFF2-40B4-BE49-F238E27FC236}">
+                  <a16:creationId xmlns:a16="http://schemas.microsoft.com/office/drawing/2014/main" id="{AA9E8771-D484-34EE-0E35-4BC77D6854D0}"/>
+                </a:ext>
+              </a:extLst>
+            </p:cNvPr>
+            <p:cNvSpPr/>
+            <p:nvPr/>
+          </p:nvSpPr>
+          <p:spPr>
+            <a:xfrm>
+              <a:off x="7835569" y="4032570"/>
+              <a:ext cx="880834" cy="440754"/>
+            </a:xfrm>
+            <a:prstGeom prst="roundRect">
+              <a:avLst/>
+            </a:prstGeom>
+            <a:solidFill>
+              <a:schemeClr val="tx1"/>
+            </a:solidFill>
+          </p:spPr>
+          <p:style>
+            <a:lnRef idx="2">
+              <a:schemeClr val="accent1">
+                <a:shade val="15000"/>
+              </a:schemeClr>
+            </a:lnRef>
+            <a:fillRef idx="1">
+              <a:schemeClr val="accent1"/>
+            </a:fillRef>
+            <a:effectRef idx="0">
+              <a:schemeClr val="accent1"/>
+            </a:effectRef>
+            <a:fontRef idx="minor">
+              <a:schemeClr val="lt1"/>
+            </a:fontRef>
+          </p:style>
+          <p:txBody>
+            <a:bodyPr rtlCol="0" anchor="ctr"/>
+            <a:lstStyle/>
+            <a:p>
+              <a:pPr algn="ctr"/>
+              <a:endParaRPr lang="fr-FR"/>
+            </a:p>
+          </p:txBody>
+        </p:sp>
+        <p:sp>
+          <p:nvSpPr>
+            <p:cNvPr id="15" name="ZoneTexte 14">
+              <a:extLst>
+                <a:ext uri="{FF2B5EF4-FFF2-40B4-BE49-F238E27FC236}">
+                  <a16:creationId xmlns:a16="http://schemas.microsoft.com/office/drawing/2014/main" id="{64798DDF-538E-5490-0675-FF941FC96D6E}"/>
+                </a:ext>
+              </a:extLst>
+            </p:cNvPr>
+            <p:cNvSpPr txBox="1"/>
+            <p:nvPr/>
+          </p:nvSpPr>
+          <p:spPr>
+            <a:xfrm>
+              <a:off x="7909382" y="4089834"/>
+              <a:ext cx="720069" cy="307777"/>
+            </a:xfrm>
+            <a:prstGeom prst="rect">
+              <a:avLst/>
+            </a:prstGeom>
+            <a:noFill/>
+          </p:spPr>
+          <p:txBody>
+            <a:bodyPr wrap="none" rtlCol="0">
+              <a:spAutoFit/>
+            </a:bodyPr>
+            <a:lstStyle/>
+            <a:p>
+              <a:r>
+                <a:rPr lang="fr-FR" sz="1400" dirty="0">
+                  <a:solidFill>
+                    <a:schemeClr val="bg1"/>
+                  </a:solidFill>
+                </a:rPr>
+                <a:t>4.8 - 6v</a:t>
+              </a:r>
+            </a:p>
+          </p:txBody>
+        </p:sp>
+      </p:grpSp>
+      <p:cxnSp>
+        <p:nvCxnSpPr>
+          <p:cNvPr id="35" name="Connecteur droit 34">
+            <a:extLst>
+              <a:ext uri="{FF2B5EF4-FFF2-40B4-BE49-F238E27FC236}">
+                <a16:creationId xmlns:a16="http://schemas.microsoft.com/office/drawing/2014/main" id="{AC548D39-594F-8764-E2CA-19989E87C68D}"/>
+              </a:ext>
+            </a:extLst>
+          </p:cNvPr>
+          <p:cNvCxnSpPr>
+            <a:cxnSpLocks/>
+          </p:cNvCxnSpPr>
+          <p:nvPr/>
+        </p:nvCxnSpPr>
+        <p:spPr>
+          <a:xfrm flipH="1">
+            <a:off x="1703810" y="4633782"/>
+            <a:ext cx="6328972" cy="0"/>
+          </a:xfrm>
+          <a:prstGeom prst="line">
+            <a:avLst/>
+          </a:prstGeom>
+          <a:ln w="38100" cap="sq">
+            <a:solidFill>
+              <a:schemeClr val="accent4">
+                <a:lumMod val="60000"/>
+                <a:lumOff val="40000"/>
+              </a:schemeClr>
+            </a:solidFill>
+          </a:ln>
+        </p:spPr>
+        <p:style>
+          <a:lnRef idx="1">
+            <a:schemeClr val="accent1"/>
+          </a:lnRef>
+          <a:fillRef idx="0">
+            <a:schemeClr val="accent1"/>
+          </a:fillRef>
+          <a:effectRef idx="0">
+            <a:schemeClr val="accent1"/>
+          </a:effectRef>
+          <a:fontRef idx="minor">
+            <a:schemeClr val="tx1"/>
+          </a:fontRef>
+        </p:style>
+      </p:cxnSp>
+      <p:cxnSp>
+        <p:nvCxnSpPr>
+          <p:cNvPr id="39" name="Connecteur droit 38">
+            <a:extLst>
+              <a:ext uri="{FF2B5EF4-FFF2-40B4-BE49-F238E27FC236}">
+                <a16:creationId xmlns:a16="http://schemas.microsoft.com/office/drawing/2014/main" id="{7EC772F3-BD60-DB7B-4E6E-F8D314BA0B6E}"/>
+              </a:ext>
+            </a:extLst>
+          </p:cNvPr>
+          <p:cNvCxnSpPr>
+            <a:cxnSpLocks/>
+          </p:cNvCxnSpPr>
+          <p:nvPr/>
+        </p:nvCxnSpPr>
+        <p:spPr>
+          <a:xfrm>
+            <a:off x="1703810" y="3364065"/>
+            <a:ext cx="0" cy="1269717"/>
+          </a:xfrm>
+          <a:prstGeom prst="line">
+            <a:avLst/>
+          </a:prstGeom>
+          <a:ln w="38100">
+            <a:solidFill>
+              <a:schemeClr val="accent4">
+                <a:lumMod val="60000"/>
+                <a:lumOff val="40000"/>
+              </a:schemeClr>
+            </a:solidFill>
+          </a:ln>
+        </p:spPr>
+        <p:style>
+          <a:lnRef idx="1">
+            <a:schemeClr val="accent1"/>
+          </a:lnRef>
+          <a:fillRef idx="0">
+            <a:schemeClr val="accent1"/>
+          </a:fillRef>
+          <a:effectRef idx="0">
+            <a:schemeClr val="accent1"/>
+          </a:effectRef>
+          <a:fontRef idx="minor">
+            <a:schemeClr val="tx1"/>
+          </a:fontRef>
+        </p:style>
+      </p:cxnSp>
+      <p:cxnSp>
+        <p:nvCxnSpPr>
+          <p:cNvPr id="40" name="Connecteur droit 39">
+            <a:extLst>
+              <a:ext uri="{FF2B5EF4-FFF2-40B4-BE49-F238E27FC236}">
+                <a16:creationId xmlns:a16="http://schemas.microsoft.com/office/drawing/2014/main" id="{884FC771-7619-C769-CE7F-C73AE35DB65F}"/>
+              </a:ext>
+            </a:extLst>
+          </p:cNvPr>
+          <p:cNvCxnSpPr>
+            <a:cxnSpLocks/>
+          </p:cNvCxnSpPr>
+          <p:nvPr/>
+        </p:nvCxnSpPr>
+        <p:spPr>
+          <a:xfrm>
+            <a:off x="1703810" y="3364065"/>
+            <a:ext cx="242865" cy="0"/>
+          </a:xfrm>
+          <a:prstGeom prst="line">
+            <a:avLst/>
+          </a:prstGeom>
+          <a:ln w="38100" cap="sq">
+            <a:solidFill>
+              <a:schemeClr val="accent4">
+                <a:lumMod val="60000"/>
+                <a:lumOff val="40000"/>
+              </a:schemeClr>
+            </a:solidFill>
+          </a:ln>
+        </p:spPr>
+        <p:style>
+          <a:lnRef idx="1">
+            <a:schemeClr val="accent1"/>
+          </a:lnRef>
+          <a:fillRef idx="0">
+            <a:schemeClr val="accent1"/>
+          </a:fillRef>
+          <a:effectRef idx="0">
+            <a:schemeClr val="accent1"/>
+          </a:effectRef>
+          <a:fontRef idx="minor">
+            <a:schemeClr val="tx1"/>
+          </a:fontRef>
+        </p:style>
+      </p:cxnSp>
+      <p:cxnSp>
+        <p:nvCxnSpPr>
+          <p:cNvPr id="46" name="Connecteur droit 45">
+            <a:extLst>
+              <a:ext uri="{FF2B5EF4-FFF2-40B4-BE49-F238E27FC236}">
+                <a16:creationId xmlns:a16="http://schemas.microsoft.com/office/drawing/2014/main" id="{026A24EF-FABB-B505-AC4E-7F603B84F33F}"/>
+              </a:ext>
+            </a:extLst>
+          </p:cNvPr>
+          <p:cNvCxnSpPr>
+            <a:cxnSpLocks/>
+          </p:cNvCxnSpPr>
+          <p:nvPr/>
+        </p:nvCxnSpPr>
+        <p:spPr>
+          <a:xfrm>
+            <a:off x="7673850" y="4144403"/>
+            <a:ext cx="206323" cy="0"/>
+          </a:xfrm>
+          <a:prstGeom prst="line">
+            <a:avLst/>
+          </a:prstGeom>
+          <a:ln w="38100" cap="sq">
+            <a:solidFill>
+              <a:schemeClr val="tx1"/>
+            </a:solidFill>
+          </a:ln>
+        </p:spPr>
+        <p:style>
+          <a:lnRef idx="1">
+            <a:schemeClr val="accent1"/>
+          </a:lnRef>
+          <a:fillRef idx="0">
+            <a:schemeClr val="accent1"/>
+          </a:fillRef>
+          <a:effectRef idx="0">
+            <a:schemeClr val="accent1"/>
+          </a:effectRef>
+          <a:fontRef idx="minor">
+            <a:schemeClr val="tx1"/>
+          </a:fontRef>
+        </p:style>
+      </p:cxnSp>
+    </p:spTree>
+    <p:extLst>
+      <p:ext uri="{BB962C8B-B14F-4D97-AF65-F5344CB8AC3E}">
+        <p14:creationId xmlns:p14="http://schemas.microsoft.com/office/powerpoint/2010/main" val="3283049519"/>
+      </p:ext>
+    </p:extLst>
+  </p:cSld>
+  <p:clrMapOvr>
+    <a:masterClrMapping/>
+  </p:clrMapOvr>
+</p:sld>
+</file>
+
 <file path=ppt/theme/theme1.xml><?xml version="1.0" encoding="utf-8"?>
 <a:theme xmlns:a="http://schemas.openxmlformats.org/drawingml/2006/main" name="Thème Office">
   <a:themeElements>
@@ -4412,7 +5777,33 @@
       </a:bgFillStyleLst>
     </a:fmtScheme>
   </a:themeElements>
-  <a:objectDefaults/>
+  <a:objectDefaults>
+    <a:lnDef>
+      <a:spPr>
+        <a:ln w="38100" cap="sq">
+          <a:solidFill>
+            <a:srgbClr val="00B050"/>
+          </a:solidFill>
+        </a:ln>
+      </a:spPr>
+      <a:bodyPr/>
+      <a:lstStyle/>
+      <a:style>
+        <a:lnRef idx="1">
+          <a:schemeClr val="accent1"/>
+        </a:lnRef>
+        <a:fillRef idx="0">
+          <a:schemeClr val="accent1"/>
+        </a:fillRef>
+        <a:effectRef idx="0">
+          <a:schemeClr val="accent1"/>
+        </a:effectRef>
+        <a:fontRef idx="minor">
+          <a:schemeClr val="tx1"/>
+        </a:fontRef>
+      </a:style>
+    </a:lnDef>
+  </a:objectDefaults>
   <a:extraClrSchemeLst/>
   <a:extLst>
     <a:ext uri="{05A4C25C-085E-4340-85A3-A5531E510DB2}">

</xml_diff>